<commit_message>
Added Week 5 course materials
</commit_message>
<xml_diff>
--- a/Training Materials/Week 4/Day 4/1. Microservices Fundamentals/Slides/2. Introducing Microservices/introducing-microservices-slides.pptx
+++ b/Training Materials/Week 4/Day 4/1. Microservices Fundamentals/Slides/2. Introducing Microservices/introducing-microservices-slides.pptx
@@ -5,7 +5,7 @@
     <p:sldMasterId id="2147483648" r:id="rId1"/>
   </p:sldMasterIdLst>
   <p:notesMasterIdLst>
-    <p:notesMasterId r:id="rId30"/>
+    <p:notesMasterId r:id="rId29"/>
   </p:notesMasterIdLst>
   <p:sldIdLst>
     <p:sldId id="256" r:id="rId3"/>
@@ -34,7 +34,6 @@
     <p:sldId id="279" r:id="rId26"/>
     <p:sldId id="280" r:id="rId27"/>
     <p:sldId id="281" r:id="rId28"/>
-    <p:sldId id="282" r:id="rId29"/>
   </p:sldIdLst>
   <p:sldSz cx="12192000" cy="6858000"/>
   <p:notesSz cx="12192000" cy="6858000"/>
@@ -13744,28 +13743,6 @@
           <a:p/>
         </p:txBody>
       </p:sp>
-      <p:pic>
-        <p:nvPicPr>
-          <p:cNvPr id="3" name="object 3"/>
-          <p:cNvPicPr/>
-          <p:nvPr/>
-        </p:nvPicPr>
-        <p:blipFill>
-          <a:blip r:embed="rId1" cstate="print"/>
-          <a:stretch>
-            <a:fillRect/>
-          </a:stretch>
-        </p:blipFill>
-        <p:spPr>
-          <a:xfrm>
-            <a:off x="11484864" y="6147815"/>
-            <a:ext cx="451103" cy="454152"/>
-          </a:xfrm>
-          <a:prstGeom prst="rect">
-            <a:avLst/>
-          </a:prstGeom>
-        </p:spPr>
-      </p:pic>
       <p:sp>
         <p:nvSpPr>
           <p:cNvPr id="4" name="object 4"/>
@@ -15183,28 +15160,6 @@
           <a:p/>
         </p:txBody>
       </p:sp>
-      <p:pic>
-        <p:nvPicPr>
-          <p:cNvPr id="3" name="object 3"/>
-          <p:cNvPicPr/>
-          <p:nvPr/>
-        </p:nvPicPr>
-        <p:blipFill>
-          <a:blip r:embed="rId1" cstate="print"/>
-          <a:stretch>
-            <a:fillRect/>
-          </a:stretch>
-        </p:blipFill>
-        <p:spPr>
-          <a:xfrm>
-            <a:off x="11484864" y="6147815"/>
-            <a:ext cx="451103" cy="454152"/>
-          </a:xfrm>
-          <a:prstGeom prst="rect">
-            <a:avLst/>
-          </a:prstGeom>
-        </p:spPr>
-      </p:pic>
       <p:sp>
         <p:nvSpPr>
           <p:cNvPr id="4" name="object 4"/>
@@ -15366,34 +15321,12 @@
       </p:grpSpPr>
       <p:pic>
         <p:nvPicPr>
-          <p:cNvPr id="2" name="object 2"/>
+          <p:cNvPr id="3" name="object 3"/>
           <p:cNvPicPr/>
           <p:nvPr/>
         </p:nvPicPr>
         <p:blipFill>
           <a:blip r:embed="rId1" cstate="print"/>
-          <a:stretch>
-            <a:fillRect/>
-          </a:stretch>
-        </p:blipFill>
-        <p:spPr>
-          <a:xfrm>
-            <a:off x="11484864" y="6147815"/>
-            <a:ext cx="451103" cy="454152"/>
-          </a:xfrm>
-          <a:prstGeom prst="rect">
-            <a:avLst/>
-          </a:prstGeom>
-        </p:spPr>
-      </p:pic>
-      <p:pic>
-        <p:nvPicPr>
-          <p:cNvPr id="3" name="object 3"/>
-          <p:cNvPicPr/>
-          <p:nvPr/>
-        </p:nvPicPr>
-        <p:blipFill>
-          <a:blip r:embed="rId2" cstate="print"/>
           <a:stretch>
             <a:fillRect/>
           </a:stretch>
@@ -15727,34 +15660,12 @@
       </p:grpSpPr>
       <p:pic>
         <p:nvPicPr>
-          <p:cNvPr id="2" name="object 2"/>
+          <p:cNvPr id="3" name="object 3"/>
           <p:cNvPicPr/>
           <p:nvPr/>
         </p:nvPicPr>
         <p:blipFill>
           <a:blip r:embed="rId1" cstate="print"/>
-          <a:stretch>
-            <a:fillRect/>
-          </a:stretch>
-        </p:blipFill>
-        <p:spPr>
-          <a:xfrm>
-            <a:off x="11484864" y="6147815"/>
-            <a:ext cx="451103" cy="454152"/>
-          </a:xfrm>
-          <a:prstGeom prst="rect">
-            <a:avLst/>
-          </a:prstGeom>
-        </p:spPr>
-      </p:pic>
-      <p:pic>
-        <p:nvPicPr>
-          <p:cNvPr id="3" name="object 3"/>
-          <p:cNvPicPr/>
-          <p:nvPr/>
-        </p:nvPicPr>
-        <p:blipFill>
-          <a:blip r:embed="rId2" cstate="print"/>
           <a:stretch>
             <a:fillRect/>
           </a:stretch>
@@ -18134,294 +18045,6 @@
               <a:t>Summary</a:t>
             </a:r>
             <a:endParaRPr sz="3600"/>
-          </a:p>
-        </p:txBody>
-      </p:sp>
-      <p:sp>
-        <p:nvSpPr>
-          <p:cNvPr id="5" name="Slide Number Placeholder 4"/>
-          <p:cNvSpPr>
-            <a:spLocks noGrp="1"/>
-          </p:cNvSpPr>
-          <p:nvPr>
-            <p:ph type="sldNum" sz="quarter" idx="7"/>
-          </p:nvPr>
-        </p:nvSpPr>
-        <p:spPr/>
-        <p:txBody>
-          <a:bodyPr/>
-          <a:p>
-            <a:fld id="{B6F15528-21DE-4FAA-801E-634DDDAF4B2B}" type="slidenum">
-              <a:rPr/>
-            </a:fld>
-            <a:endParaRPr/>
-          </a:p>
-        </p:txBody>
-      </p:sp>
-    </p:spTree>
-  </p:cSld>
-  <p:clrMapOvr>
-    <a:masterClrMapping/>
-  </p:clrMapOvr>
-</p:sld>
-</file>
-
-<file path=ppt/slides/slide27.xml><?xml version="1.0" encoding="utf-8"?>
-<p:sld xmlns:a="http://schemas.openxmlformats.org/drawingml/2006/main" xmlns:r="http://schemas.openxmlformats.org/officeDocument/2006/relationships" xmlns:p="http://schemas.openxmlformats.org/presentationml/2006/main" showMasterSp="0">
-  <p:cSld>
-    <p:spTree>
-      <p:nvGrpSpPr>
-        <p:cNvPr id="1" name=""/>
-        <p:cNvGrpSpPr/>
-        <p:nvPr/>
-      </p:nvGrpSpPr>
-      <p:grpSpPr>
-        <a:xfrm>
-          <a:off x="0" y="0"/>
-          <a:ext cx="0" cy="0"/>
-          <a:chOff x="0" y="0"/>
-          <a:chExt cx="0" cy="0"/>
-        </a:xfrm>
-      </p:grpSpPr>
-      <p:sp>
-        <p:nvSpPr>
-          <p:cNvPr id="2" name="object 2"/>
-          <p:cNvSpPr/>
-          <p:nvPr/>
-        </p:nvSpPr>
-        <p:spPr>
-          <a:xfrm>
-            <a:off x="0" y="0"/>
-            <a:ext cx="12192000" cy="6858000"/>
-          </a:xfrm>
-          <a:custGeom>
-            <a:avLst/>
-            <a:gdLst/>
-            <a:ahLst/>
-            <a:cxnLst/>
-            <a:rect l="l" t="t" r="r" b="b"/>
-            <a:pathLst>
-              <a:path w="12192000" h="6858000">
-                <a:moveTo>
-                  <a:pt x="12192000" y="0"/>
-                </a:moveTo>
-                <a:lnTo>
-                  <a:pt x="0" y="0"/>
-                </a:lnTo>
-                <a:lnTo>
-                  <a:pt x="0" y="6857999"/>
-                </a:lnTo>
-                <a:lnTo>
-                  <a:pt x="12192000" y="6857999"/>
-                </a:lnTo>
-                <a:lnTo>
-                  <a:pt x="12192000" y="0"/>
-                </a:lnTo>
-                <a:close/>
-              </a:path>
-            </a:pathLst>
-          </a:custGeom>
-          <a:solidFill>
-            <a:srgbClr val="2A9FBC"/>
-          </a:solidFill>
-        </p:spPr>
-        <p:txBody>
-          <a:bodyPr wrap="square" lIns="0" tIns="0" rIns="0" bIns="0" rtlCol="0"/>
-          <a:lstStyle/>
-          <a:p/>
-        </p:txBody>
-      </p:sp>
-      <p:pic>
-        <p:nvPicPr>
-          <p:cNvPr id="3" name="object 3"/>
-          <p:cNvPicPr/>
-          <p:nvPr/>
-        </p:nvPicPr>
-        <p:blipFill>
-          <a:blip r:embed="rId1" cstate="print"/>
-          <a:stretch>
-            <a:fillRect/>
-          </a:stretch>
-        </p:blipFill>
-        <p:spPr>
-          <a:xfrm>
-            <a:off x="11484864" y="6147815"/>
-            <a:ext cx="451103" cy="454152"/>
-          </a:xfrm>
-          <a:prstGeom prst="rect">
-            <a:avLst/>
-          </a:prstGeom>
-        </p:spPr>
-      </p:pic>
-      <p:sp>
-        <p:nvSpPr>
-          <p:cNvPr id="4" name="object 4"/>
-          <p:cNvSpPr txBox="1">
-            <a:spLocks noGrp="1"/>
-          </p:cNvSpPr>
-          <p:nvPr>
-            <p:ph type="title"/>
-          </p:nvPr>
-        </p:nvSpPr>
-        <p:spPr>
-          <a:xfrm>
-            <a:off x="2237287" y="2343403"/>
-            <a:ext cx="7639050" cy="2004060"/>
-          </a:xfrm>
-          <a:prstGeom prst="rect">
-            <a:avLst/>
-          </a:prstGeom>
-        </p:spPr>
-        <p:txBody>
-          <a:bodyPr vert="horz" wrap="square" lIns="0" tIns="12700" rIns="0" bIns="0" rtlCol="0">
-            <a:spAutoFit/>
-          </a:bodyPr>
-          <a:lstStyle/>
-          <a:p>
-            <a:pPr marL="12700" algn="ctr">
-              <a:lnSpc>
-                <a:spcPct val="100000"/>
-              </a:lnSpc>
-              <a:spcBef>
-                <a:spcPts val="100"/>
-              </a:spcBef>
-            </a:pPr>
-            <a:r>
-              <a:rPr sz="4800" spc="55" dirty="0"/>
-              <a:t>U</a:t>
-            </a:r>
-            <a:r>
-              <a:rPr sz="4800" spc="140" dirty="0"/>
-              <a:t>p</a:t>
-            </a:r>
-            <a:r>
-              <a:rPr sz="4800" spc="-480" dirty="0"/>
-              <a:t> </a:t>
-            </a:r>
-            <a:r>
-              <a:rPr sz="4800" spc="-220" dirty="0"/>
-              <a:t>n</a:t>
-            </a:r>
-            <a:r>
-              <a:rPr sz="4800" spc="-325" dirty="0"/>
-              <a:t>e</a:t>
-            </a:r>
-            <a:r>
-              <a:rPr sz="4800" spc="-220" dirty="0"/>
-              <a:t>x</a:t>
-            </a:r>
-            <a:r>
-              <a:rPr sz="4800" spc="-85" dirty="0"/>
-              <a:t>t</a:t>
-            </a:r>
-            <a:r>
-              <a:rPr sz="4800" spc="-665" dirty="0"/>
-              <a:t>…</a:t>
-            </a:r>
-            <a:endParaRPr sz="4800"/>
-          </a:p>
-          <a:p>
-            <a:pPr algn="ctr">
-              <a:lnSpc>
-                <a:spcPct val="100000"/>
-              </a:lnSpc>
-              <a:spcBef>
-                <a:spcPts val="4055"/>
-              </a:spcBef>
-            </a:pPr>
-            <a:r>
-              <a:rPr sz="4800" spc="390" dirty="0"/>
-              <a:t>A</a:t>
-            </a:r>
-            <a:r>
-              <a:rPr sz="4800" spc="-360" dirty="0"/>
-              <a:t>r</a:t>
-            </a:r>
-            <a:r>
-              <a:rPr sz="4800" spc="-114" dirty="0"/>
-              <a:t>ch</a:t>
-            </a:r>
-            <a:r>
-              <a:rPr sz="4800" spc="-110" dirty="0"/>
-              <a:t>i</a:t>
-            </a:r>
-            <a:r>
-              <a:rPr sz="4800" spc="-155" dirty="0"/>
-              <a:t>t</a:t>
-            </a:r>
-            <a:r>
-              <a:rPr sz="4800" spc="-45" dirty="0"/>
-              <a:t>ec</a:t>
-            </a:r>
-            <a:r>
-              <a:rPr sz="4800" spc="-55" dirty="0"/>
-              <a:t>t</a:t>
-            </a:r>
-            <a:r>
-              <a:rPr sz="4800" spc="-235" dirty="0"/>
-              <a:t>i</a:t>
-            </a:r>
-            <a:r>
-              <a:rPr sz="4800" spc="-80" dirty="0"/>
-              <a:t>n</a:t>
-            </a:r>
-            <a:r>
-              <a:rPr sz="4800" spc="40" dirty="0"/>
-              <a:t>g</a:t>
-            </a:r>
-            <a:r>
-              <a:rPr sz="4800" spc="-484" dirty="0"/>
-              <a:t> </a:t>
-            </a:r>
-            <a:r>
-              <a:rPr sz="4800" spc="-220" dirty="0"/>
-              <a:t>m</a:t>
-            </a:r>
-            <a:r>
-              <a:rPr sz="4800" spc="-235" dirty="0"/>
-              <a:t>i</a:t>
-            </a:r>
-            <a:r>
-              <a:rPr sz="4800" spc="120" dirty="0"/>
-              <a:t>c</a:t>
-            </a:r>
-            <a:r>
-              <a:rPr sz="4800" spc="-360" dirty="0"/>
-              <a:t>r</a:t>
-            </a:r>
-            <a:r>
-              <a:rPr sz="4800" spc="45" dirty="0"/>
-              <a:t>o</a:t>
-            </a:r>
-            <a:r>
-              <a:rPr sz="4800" spc="-235" dirty="0"/>
-              <a:t>s</a:t>
-            </a:r>
-            <a:r>
-              <a:rPr sz="4800" spc="-229" dirty="0"/>
-              <a:t>e</a:t>
-            </a:r>
-            <a:r>
-              <a:rPr sz="4800" spc="-190" dirty="0"/>
-              <a:t>r</a:t>
-            </a:r>
-            <a:r>
-              <a:rPr sz="4800" spc="-240" dirty="0"/>
-              <a:t>v</a:t>
-            </a:r>
-            <a:r>
-              <a:rPr sz="4800" spc="-165" dirty="0"/>
-              <a:t>i</a:t>
-            </a:r>
-            <a:r>
-              <a:rPr sz="4800" spc="50" dirty="0"/>
-              <a:t>c</a:t>
-            </a:r>
-            <a:r>
-              <a:rPr sz="4800" spc="-210" dirty="0"/>
-              <a:t>es</a:t>
-            </a:r>
-            <a:endParaRPr sz="4800"/>
           </a:p>
         </p:txBody>
       </p:sp>

</xml_diff>